<commit_message>
new project folder for environment setup
</commit_message>
<xml_diff>
--- a/React-native.pptx
+++ b/React-native.pptx
@@ -11,6 +11,7 @@
     <p:sldId id="259" r:id="rId5"/>
     <p:sldId id="260" r:id="rId6"/>
     <p:sldId id="261" r:id="rId7"/>
+    <p:sldId id="262" r:id="rId8"/>
   </p:sldIdLst>
   <p:sldSz cx="12192000" cy="6858000"/>
   <p:notesSz cx="6858000" cy="9144000"/>
@@ -109,6 +110,11 @@
       </a:defRPr>
     </a:lvl9pPr>
   </p:defaultTextStyle>
+  <p:extLst>
+    <p:ext uri="{EFAFB233-063F-42B5-8137-9DF3F51BA10A}">
+      <p15:sldGuideLst xmlns:p15="http://schemas.microsoft.com/office/powerpoint/2012/main"/>
+    </p:ext>
+  </p:extLst>
 </p:presentation>
 </file>
 
@@ -857,7 +863,7 @@
           <a:p>
             <a:fld id="{F19FBBE3-76C2-450C-A94C-296D63087165}" type="datetimeFigureOut">
               <a:rPr lang="en-IN" smtClean="0"/>
-              <a:t>26-11-2022</a:t>
+              <a:t>30-11-2022</a:t>
             </a:fld>
             <a:endParaRPr lang="en-IN"/>
           </a:p>
@@ -1108,7 +1114,7 @@
           <a:p>
             <a:fld id="{F19FBBE3-76C2-450C-A94C-296D63087165}" type="datetimeFigureOut">
               <a:rPr lang="en-IN" smtClean="0"/>
-              <a:t>26-11-2022</a:t>
+              <a:t>30-11-2022</a:t>
             </a:fld>
             <a:endParaRPr lang="en-IN"/>
           </a:p>
@@ -1422,7 +1428,7 @@
           <a:p>
             <a:fld id="{F19FBBE3-76C2-450C-A94C-296D63087165}" type="datetimeFigureOut">
               <a:rPr lang="en-IN" smtClean="0"/>
-              <a:t>26-11-2022</a:t>
+              <a:t>30-11-2022</a:t>
             </a:fld>
             <a:endParaRPr lang="en-IN"/>
           </a:p>
@@ -1755,7 +1761,7 @@
           <a:p>
             <a:fld id="{F19FBBE3-76C2-450C-A94C-296D63087165}" type="datetimeFigureOut">
               <a:rPr lang="en-IN" smtClean="0"/>
-              <a:t>26-11-2022</a:t>
+              <a:t>30-11-2022</a:t>
             </a:fld>
             <a:endParaRPr lang="en-IN"/>
           </a:p>
@@ -2069,7 +2075,7 @@
           <a:p>
             <a:fld id="{F19FBBE3-76C2-450C-A94C-296D63087165}" type="datetimeFigureOut">
               <a:rPr lang="en-IN" smtClean="0"/>
-              <a:t>26-11-2022</a:t>
+              <a:t>30-11-2022</a:t>
             </a:fld>
             <a:endParaRPr lang="en-IN"/>
           </a:p>
@@ -2462,7 +2468,7 @@
           <a:p>
             <a:fld id="{F19FBBE3-76C2-450C-A94C-296D63087165}" type="datetimeFigureOut">
               <a:rPr lang="en-IN" smtClean="0"/>
-              <a:t>26-11-2022</a:t>
+              <a:t>30-11-2022</a:t>
             </a:fld>
             <a:endParaRPr lang="en-IN"/>
           </a:p>
@@ -2632,7 +2638,7 @@
           <a:p>
             <a:fld id="{F19FBBE3-76C2-450C-A94C-296D63087165}" type="datetimeFigureOut">
               <a:rPr lang="en-IN" smtClean="0"/>
-              <a:t>26-11-2022</a:t>
+              <a:t>30-11-2022</a:t>
             </a:fld>
             <a:endParaRPr lang="en-IN"/>
           </a:p>
@@ -2812,7 +2818,7 @@
           <a:p>
             <a:fld id="{F19FBBE3-76C2-450C-A94C-296D63087165}" type="datetimeFigureOut">
               <a:rPr lang="en-IN" smtClean="0"/>
-              <a:t>26-11-2022</a:t>
+              <a:t>30-11-2022</a:t>
             </a:fld>
             <a:endParaRPr lang="en-IN"/>
           </a:p>
@@ -2982,7 +2988,7 @@
           <a:p>
             <a:fld id="{F19FBBE3-76C2-450C-A94C-296D63087165}" type="datetimeFigureOut">
               <a:rPr lang="en-IN" smtClean="0"/>
-              <a:t>26-11-2022</a:t>
+              <a:t>30-11-2022</a:t>
             </a:fld>
             <a:endParaRPr lang="en-IN"/>
           </a:p>
@@ -3229,7 +3235,7 @@
           <a:p>
             <a:fld id="{F19FBBE3-76C2-450C-A94C-296D63087165}" type="datetimeFigureOut">
               <a:rPr lang="en-IN" smtClean="0"/>
-              <a:t>26-11-2022</a:t>
+              <a:t>30-11-2022</a:t>
             </a:fld>
             <a:endParaRPr lang="en-IN"/>
           </a:p>
@@ -3461,7 +3467,7 @@
           <a:p>
             <a:fld id="{F19FBBE3-76C2-450C-A94C-296D63087165}" type="datetimeFigureOut">
               <a:rPr lang="en-IN" smtClean="0"/>
-              <a:t>26-11-2022</a:t>
+              <a:t>30-11-2022</a:t>
             </a:fld>
             <a:endParaRPr lang="en-IN"/>
           </a:p>
@@ -3835,7 +3841,7 @@
           <a:p>
             <a:fld id="{F19FBBE3-76C2-450C-A94C-296D63087165}" type="datetimeFigureOut">
               <a:rPr lang="en-IN" smtClean="0"/>
-              <a:t>26-11-2022</a:t>
+              <a:t>30-11-2022</a:t>
             </a:fld>
             <a:endParaRPr lang="en-IN"/>
           </a:p>
@@ -3958,7 +3964,7 @@
           <a:p>
             <a:fld id="{F19FBBE3-76C2-450C-A94C-296D63087165}" type="datetimeFigureOut">
               <a:rPr lang="en-IN" smtClean="0"/>
-              <a:t>26-11-2022</a:t>
+              <a:t>30-11-2022</a:t>
             </a:fld>
             <a:endParaRPr lang="en-IN"/>
           </a:p>
@@ -4053,7 +4059,7 @@
           <a:p>
             <a:fld id="{F19FBBE3-76C2-450C-A94C-296D63087165}" type="datetimeFigureOut">
               <a:rPr lang="en-IN" smtClean="0"/>
-              <a:t>26-11-2022</a:t>
+              <a:t>30-11-2022</a:t>
             </a:fld>
             <a:endParaRPr lang="en-IN"/>
           </a:p>
@@ -4308,7 +4314,7 @@
           <a:p>
             <a:fld id="{F19FBBE3-76C2-450C-A94C-296D63087165}" type="datetimeFigureOut">
               <a:rPr lang="en-IN" smtClean="0"/>
-              <a:t>26-11-2022</a:t>
+              <a:t>30-11-2022</a:t>
             </a:fld>
             <a:endParaRPr lang="en-IN"/>
           </a:p>
@@ -4613,7 +4619,7 @@
           <a:p>
             <a:fld id="{F19FBBE3-76C2-450C-A94C-296D63087165}" type="datetimeFigureOut">
               <a:rPr lang="en-IN" smtClean="0"/>
-              <a:t>26-11-2022</a:t>
+              <a:t>30-11-2022</a:t>
             </a:fld>
             <a:endParaRPr lang="en-IN"/>
           </a:p>
@@ -5315,7 +5321,7 @@
           <a:p>
             <a:fld id="{F19FBBE3-76C2-450C-A94C-296D63087165}" type="datetimeFigureOut">
               <a:rPr lang="en-IN" smtClean="0"/>
-              <a:t>26-11-2022</a:t>
+              <a:t>30-11-2022</a:t>
             </a:fld>
             <a:endParaRPr lang="en-IN"/>
           </a:p>
@@ -6665,6 +6671,123 @@
 </p:sld>
 </file>
 
+<file path=ppt/slides/slide7.xml><?xml version="1.0" encoding="utf-8"?>
+<p:sld xmlns:a="http://schemas.openxmlformats.org/drawingml/2006/main" xmlns:r="http://schemas.openxmlformats.org/officeDocument/2006/relationships" xmlns:p="http://schemas.openxmlformats.org/presentationml/2006/main">
+  <p:cSld>
+    <p:spTree>
+      <p:nvGrpSpPr>
+        <p:cNvPr id="1" name=""/>
+        <p:cNvGrpSpPr/>
+        <p:nvPr/>
+      </p:nvGrpSpPr>
+      <p:grpSpPr>
+        <a:xfrm>
+          <a:off x="0" y="0"/>
+          <a:ext cx="0" cy="0"/>
+          <a:chOff x="0" y="0"/>
+          <a:chExt cx="0" cy="0"/>
+        </a:xfrm>
+      </p:grpSpPr>
+      <p:sp>
+        <p:nvSpPr>
+          <p:cNvPr id="2" name="Title 1">
+            <a:extLst>
+              <a:ext uri="{FF2B5EF4-FFF2-40B4-BE49-F238E27FC236}">
+                <a16:creationId xmlns:a16="http://schemas.microsoft.com/office/drawing/2014/main" id="{1E186036-6377-0B2F-1487-CB605FDD69FD}"/>
+              </a:ext>
+            </a:extLst>
+          </p:cNvPr>
+          <p:cNvSpPr>
+            <a:spLocks noGrp="1"/>
+          </p:cNvSpPr>
+          <p:nvPr>
+            <p:ph type="title"/>
+          </p:nvPr>
+        </p:nvSpPr>
+        <p:spPr/>
+        <p:txBody>
+          <a:bodyPr/>
+          <a:lstStyle/>
+          <a:p>
+            <a:r>
+              <a:rPr lang="en-IN" dirty="0"/>
+              <a:t>2. Environment Setup</a:t>
+            </a:r>
+          </a:p>
+        </p:txBody>
+      </p:sp>
+      <p:sp>
+        <p:nvSpPr>
+          <p:cNvPr id="3" name="Content Placeholder 2">
+            <a:extLst>
+              <a:ext uri="{FF2B5EF4-FFF2-40B4-BE49-F238E27FC236}">
+                <a16:creationId xmlns:a16="http://schemas.microsoft.com/office/drawing/2014/main" id="{993B1E0B-8350-2ED6-0A8E-5426BD287986}"/>
+              </a:ext>
+            </a:extLst>
+          </p:cNvPr>
+          <p:cNvSpPr>
+            <a:spLocks noGrp="1"/>
+          </p:cNvSpPr>
+          <p:nvPr>
+            <p:ph idx="1"/>
+          </p:nvPr>
+        </p:nvSpPr>
+        <p:spPr/>
+        <p:txBody>
+          <a:bodyPr/>
+          <a:lstStyle/>
+          <a:p>
+            <a:r>
+              <a:rPr lang="en-IN" dirty="0"/>
+              <a:t>Node</a:t>
+            </a:r>
+          </a:p>
+          <a:p>
+            <a:r>
+              <a:rPr lang="en-IN" dirty="0" err="1"/>
+              <a:t>Npm</a:t>
+            </a:r>
+            <a:endParaRPr lang="en-IN" dirty="0"/>
+          </a:p>
+          <a:p>
+            <a:r>
+              <a:rPr lang="en-IN" dirty="0"/>
+              <a:t>Java</a:t>
+            </a:r>
+          </a:p>
+          <a:p>
+            <a:r>
+              <a:rPr lang="en-IN" dirty="0"/>
+              <a:t>Android Studio</a:t>
+            </a:r>
+          </a:p>
+          <a:p>
+            <a:r>
+              <a:rPr lang="en-IN" dirty="0"/>
+              <a:t>Expo</a:t>
+            </a:r>
+          </a:p>
+          <a:p>
+            <a:r>
+              <a:rPr lang="en-IN" dirty="0"/>
+              <a:t>Vs Code</a:t>
+            </a:r>
+          </a:p>
+        </p:txBody>
+      </p:sp>
+    </p:spTree>
+    <p:extLst>
+      <p:ext uri="{BB962C8B-B14F-4D97-AF65-F5344CB8AC3E}">
+        <p14:creationId xmlns:p14="http://schemas.microsoft.com/office/powerpoint/2010/main" val="1005663305"/>
+      </p:ext>
+    </p:extLst>
+  </p:cSld>
+  <p:clrMapOvr>
+    <a:masterClrMapping/>
+  </p:clrMapOvr>
+</p:sld>
+</file>
+
 <file path=ppt/theme/theme1.xml><?xml version="1.0" encoding="utf-8"?>
 <a:theme xmlns:a="http://schemas.openxmlformats.org/drawingml/2006/main" name="Facet">
   <a:themeElements>

</xml_diff>

<commit_message>
safeareaview and status bar
</commit_message>
<xml_diff>
--- a/React-native.pptx
+++ b/React-native.pptx
@@ -15,6 +15,7 @@
     <p:sldId id="263" r:id="rId9"/>
     <p:sldId id="264" r:id="rId10"/>
     <p:sldId id="265" r:id="rId11"/>
+    <p:sldId id="266" r:id="rId12"/>
   </p:sldIdLst>
   <p:sldSz cx="12192000" cy="6858000"/>
   <p:notesSz cx="6858000" cy="9144000"/>
@@ -866,7 +867,7 @@
           <a:p>
             <a:fld id="{F19FBBE3-76C2-450C-A94C-296D63087165}" type="datetimeFigureOut">
               <a:rPr lang="en-IN" smtClean="0"/>
-              <a:t>18-03-2023</a:t>
+              <a:t>12-04-2023</a:t>
             </a:fld>
             <a:endParaRPr lang="en-IN"/>
           </a:p>
@@ -1117,7 +1118,7 @@
           <a:p>
             <a:fld id="{F19FBBE3-76C2-450C-A94C-296D63087165}" type="datetimeFigureOut">
               <a:rPr lang="en-IN" smtClean="0"/>
-              <a:t>18-03-2023</a:t>
+              <a:t>12-04-2023</a:t>
             </a:fld>
             <a:endParaRPr lang="en-IN"/>
           </a:p>
@@ -1431,7 +1432,7 @@
           <a:p>
             <a:fld id="{F19FBBE3-76C2-450C-A94C-296D63087165}" type="datetimeFigureOut">
               <a:rPr lang="en-IN" smtClean="0"/>
-              <a:t>18-03-2023</a:t>
+              <a:t>12-04-2023</a:t>
             </a:fld>
             <a:endParaRPr lang="en-IN"/>
           </a:p>
@@ -1764,7 +1765,7 @@
           <a:p>
             <a:fld id="{F19FBBE3-76C2-450C-A94C-296D63087165}" type="datetimeFigureOut">
               <a:rPr lang="en-IN" smtClean="0"/>
-              <a:t>18-03-2023</a:t>
+              <a:t>12-04-2023</a:t>
             </a:fld>
             <a:endParaRPr lang="en-IN"/>
           </a:p>
@@ -2078,7 +2079,7 @@
           <a:p>
             <a:fld id="{F19FBBE3-76C2-450C-A94C-296D63087165}" type="datetimeFigureOut">
               <a:rPr lang="en-IN" smtClean="0"/>
-              <a:t>18-03-2023</a:t>
+              <a:t>12-04-2023</a:t>
             </a:fld>
             <a:endParaRPr lang="en-IN"/>
           </a:p>
@@ -2471,7 +2472,7 @@
           <a:p>
             <a:fld id="{F19FBBE3-76C2-450C-A94C-296D63087165}" type="datetimeFigureOut">
               <a:rPr lang="en-IN" smtClean="0"/>
-              <a:t>18-03-2023</a:t>
+              <a:t>12-04-2023</a:t>
             </a:fld>
             <a:endParaRPr lang="en-IN"/>
           </a:p>
@@ -2641,7 +2642,7 @@
           <a:p>
             <a:fld id="{F19FBBE3-76C2-450C-A94C-296D63087165}" type="datetimeFigureOut">
               <a:rPr lang="en-IN" smtClean="0"/>
-              <a:t>18-03-2023</a:t>
+              <a:t>12-04-2023</a:t>
             </a:fld>
             <a:endParaRPr lang="en-IN"/>
           </a:p>
@@ -2821,7 +2822,7 @@
           <a:p>
             <a:fld id="{F19FBBE3-76C2-450C-A94C-296D63087165}" type="datetimeFigureOut">
               <a:rPr lang="en-IN" smtClean="0"/>
-              <a:t>18-03-2023</a:t>
+              <a:t>12-04-2023</a:t>
             </a:fld>
             <a:endParaRPr lang="en-IN"/>
           </a:p>
@@ -2991,7 +2992,7 @@
           <a:p>
             <a:fld id="{F19FBBE3-76C2-450C-A94C-296D63087165}" type="datetimeFigureOut">
               <a:rPr lang="en-IN" smtClean="0"/>
-              <a:t>18-03-2023</a:t>
+              <a:t>12-04-2023</a:t>
             </a:fld>
             <a:endParaRPr lang="en-IN"/>
           </a:p>
@@ -3238,7 +3239,7 @@
           <a:p>
             <a:fld id="{F19FBBE3-76C2-450C-A94C-296D63087165}" type="datetimeFigureOut">
               <a:rPr lang="en-IN" smtClean="0"/>
-              <a:t>18-03-2023</a:t>
+              <a:t>12-04-2023</a:t>
             </a:fld>
             <a:endParaRPr lang="en-IN"/>
           </a:p>
@@ -3470,7 +3471,7 @@
           <a:p>
             <a:fld id="{F19FBBE3-76C2-450C-A94C-296D63087165}" type="datetimeFigureOut">
               <a:rPr lang="en-IN" smtClean="0"/>
-              <a:t>18-03-2023</a:t>
+              <a:t>12-04-2023</a:t>
             </a:fld>
             <a:endParaRPr lang="en-IN"/>
           </a:p>
@@ -3844,7 +3845,7 @@
           <a:p>
             <a:fld id="{F19FBBE3-76C2-450C-A94C-296D63087165}" type="datetimeFigureOut">
               <a:rPr lang="en-IN" smtClean="0"/>
-              <a:t>18-03-2023</a:t>
+              <a:t>12-04-2023</a:t>
             </a:fld>
             <a:endParaRPr lang="en-IN"/>
           </a:p>
@@ -3967,7 +3968,7 @@
           <a:p>
             <a:fld id="{F19FBBE3-76C2-450C-A94C-296D63087165}" type="datetimeFigureOut">
               <a:rPr lang="en-IN" smtClean="0"/>
-              <a:t>18-03-2023</a:t>
+              <a:t>12-04-2023</a:t>
             </a:fld>
             <a:endParaRPr lang="en-IN"/>
           </a:p>
@@ -4062,7 +4063,7 @@
           <a:p>
             <a:fld id="{F19FBBE3-76C2-450C-A94C-296D63087165}" type="datetimeFigureOut">
               <a:rPr lang="en-IN" smtClean="0"/>
-              <a:t>18-03-2023</a:t>
+              <a:t>12-04-2023</a:t>
             </a:fld>
             <a:endParaRPr lang="en-IN"/>
           </a:p>
@@ -4317,7 +4318,7 @@
           <a:p>
             <a:fld id="{F19FBBE3-76C2-450C-A94C-296D63087165}" type="datetimeFigureOut">
               <a:rPr lang="en-IN" smtClean="0"/>
-              <a:t>18-03-2023</a:t>
+              <a:t>12-04-2023</a:t>
             </a:fld>
             <a:endParaRPr lang="en-IN"/>
           </a:p>
@@ -4622,7 +4623,7 @@
           <a:p>
             <a:fld id="{F19FBBE3-76C2-450C-A94C-296D63087165}" type="datetimeFigureOut">
               <a:rPr lang="en-IN" smtClean="0"/>
-              <a:t>18-03-2023</a:t>
+              <a:t>12-04-2023</a:t>
             </a:fld>
             <a:endParaRPr lang="en-IN"/>
           </a:p>
@@ -5324,7 +5325,7 @@
           <a:p>
             <a:fld id="{F19FBBE3-76C2-450C-A94C-296D63087165}" type="datetimeFigureOut">
               <a:rPr lang="en-IN" smtClean="0"/>
-              <a:t>18-03-2023</a:t>
+              <a:t>12-04-2023</a:t>
             </a:fld>
             <a:endParaRPr lang="en-IN"/>
           </a:p>
@@ -6050,6 +6051,64 @@
 </p:sld>
 </file>
 
+<file path=ppt/slides/slide11.xml><?xml version="1.0" encoding="utf-8"?>
+<p:sld xmlns:a="http://schemas.openxmlformats.org/drawingml/2006/main" xmlns:r="http://schemas.openxmlformats.org/officeDocument/2006/relationships" xmlns:p="http://schemas.openxmlformats.org/presentationml/2006/main">
+  <p:cSld>
+    <p:spTree>
+      <p:nvGrpSpPr>
+        <p:cNvPr id="1" name=""/>
+        <p:cNvGrpSpPr/>
+        <p:nvPr/>
+      </p:nvGrpSpPr>
+      <p:grpSpPr>
+        <a:xfrm>
+          <a:off x="0" y="0"/>
+          <a:ext cx="0" cy="0"/>
+          <a:chOff x="0" y="0"/>
+          <a:chExt cx="0" cy="0"/>
+        </a:xfrm>
+      </p:grpSpPr>
+      <p:sp>
+        <p:nvSpPr>
+          <p:cNvPr id="2" name="Title 1">
+            <a:extLst>
+              <a:ext uri="{FF2B5EF4-FFF2-40B4-BE49-F238E27FC236}">
+                <a16:creationId xmlns:a16="http://schemas.microsoft.com/office/drawing/2014/main" id="{744EA9A7-A574-C317-8B2D-AD632BD66E0E}"/>
+              </a:ext>
+            </a:extLst>
+          </p:cNvPr>
+          <p:cNvSpPr>
+            <a:spLocks noGrp="1"/>
+          </p:cNvSpPr>
+          <p:nvPr>
+            <p:ph type="title"/>
+          </p:nvPr>
+        </p:nvSpPr>
+        <p:spPr/>
+        <p:txBody>
+          <a:bodyPr/>
+          <a:lstStyle/>
+          <a:p>
+            <a:r>
+              <a:rPr lang="en-IN" dirty="0"/>
+              <a:t>5. React Native Components</a:t>
+            </a:r>
+          </a:p>
+        </p:txBody>
+      </p:sp>
+    </p:spTree>
+    <p:extLst>
+      <p:ext uri="{BB962C8B-B14F-4D97-AF65-F5344CB8AC3E}">
+        <p14:creationId xmlns:p14="http://schemas.microsoft.com/office/powerpoint/2010/main" val="809312650"/>
+      </p:ext>
+    </p:extLst>
+  </p:cSld>
+  <p:clrMapOvr>
+    <a:masterClrMapping/>
+  </p:clrMapOvr>
+</p:sld>
+</file>
+
 <file path=ppt/slides/slide2.xml><?xml version="1.0" encoding="utf-8"?>
 <p:sld xmlns:a="http://schemas.openxmlformats.org/drawingml/2006/main" xmlns:r="http://schemas.openxmlformats.org/officeDocument/2006/relationships" xmlns:p="http://schemas.openxmlformats.org/presentationml/2006/main">
   <p:cSld>

</xml_diff>